<commit_message>
Updated presentation for IETF 116
</commit_message>
<xml_diff>
--- a/presentations/IETF 116 - YANG Data Model for Microwave Topology-05-v01.pptx
+++ b/presentations/IETF 116 - YANG Data Model for Microwave Topology-05-v01.pptx
@@ -5,12 +5,13 @@
     <p:sldMasterId id="2147483648" r:id="rId1"/>
   </p:sldMasterIdLst>
   <p:notesMasterIdLst>
-    <p:notesMasterId r:id="rId5"/>
+    <p:notesMasterId r:id="rId6"/>
   </p:notesMasterIdLst>
   <p:sldIdLst>
     <p:sldId id="264" r:id="rId2"/>
     <p:sldId id="269" r:id="rId3"/>
-    <p:sldId id="274" r:id="rId4"/>
+    <p:sldId id="275" r:id="rId4"/>
+    <p:sldId id="274" r:id="rId5"/>
   </p:sldIdLst>
   <p:sldSz cx="12192000" cy="6858000"/>
   <p:notesSz cx="6858000" cy="9144000"/>
@@ -210,7 +211,7 @@
           <a:p>
             <a:fld id="{044BB300-C1C9-45C3-B1B3-3FE1F605C356}" type="datetimeFigureOut">
               <a:rPr lang="en-US" smtClean="0"/>
-              <a:t>2/16/2023</a:t>
+              <a:t>3/9/2023</a:t>
             </a:fld>
             <a:endParaRPr lang="en-US"/>
           </a:p>
@@ -3934,7 +3935,9 @@
         </p:nvSpPr>
         <p:spPr/>
         <p:txBody>
-          <a:bodyPr/>
+          <a:bodyPr>
+            <a:normAutofit fontScale="92500" lnSpcReduction="20000"/>
+          </a:bodyPr>
           <a:lstStyle/>
           <a:p>
             <a:r>
@@ -4006,6 +4009,58 @@
               <a:rPr lang="en-US" dirty="0"/>
               <a:t>No material changes to the content, just moved it around to enable the bandwidth availability topology and interface reference topology work to be reused by other technologies (not just for microwave)</a:t>
             </a:r>
+          </a:p>
+          <a:p>
+            <a:pPr lvl="1"/>
+            <a:r>
+              <a:rPr lang="en-US" dirty="0"/>
+              <a:t>As noted by a CCAMP WG Chair:</a:t>
+            </a:r>
+          </a:p>
+          <a:p>
+            <a:pPr lvl="2"/>
+            <a:r>
+              <a:rPr lang="en-US" dirty="0">
+                <a:solidFill>
+                  <a:srgbClr val="242424"/>
+                </a:solidFill>
+                <a:latin typeface="Segoe UI" panose="020B0502040204020203" pitchFamily="34" charset="0"/>
+              </a:rPr>
+              <a:t>P</a:t>
+            </a:r>
+            <a:r>
+              <a:rPr lang="en-US" b="0" i="0" dirty="0">
+                <a:solidFill>
+                  <a:srgbClr val="242424"/>
+                </a:solidFill>
+                <a:effectLst/>
+                <a:latin typeface="Segoe UI" panose="020B0502040204020203" pitchFamily="34" charset="0"/>
+              </a:rPr>
+              <a:t>lease note that the two new drafts have been published as WG documents since it's just a split of the model already adopted by the WG.</a:t>
+            </a:r>
+          </a:p>
+          <a:p>
+            <a:pPr lvl="2"/>
+            <a:r>
+              <a:rPr lang="en-US" dirty="0">
+                <a:solidFill>
+                  <a:srgbClr val="242424"/>
+                </a:solidFill>
+                <a:latin typeface="Segoe UI" panose="020B0502040204020203" pitchFamily="34" charset="0"/>
+              </a:rPr>
+              <a:t>See summary here: </a:t>
+            </a:r>
+            <a:r>
+              <a:rPr lang="en-US" dirty="0">
+                <a:solidFill>
+                  <a:srgbClr val="242424"/>
+                </a:solidFill>
+                <a:latin typeface="Segoe UI" panose="020B0502040204020203" pitchFamily="34" charset="0"/>
+                <a:hlinkClick r:id="rId5"/>
+              </a:rPr>
+              <a:t>https://mailarchive.ietf.org/arch/msg/ccamp/2NlCZa6rN85bm9eezYrwwNtbhmc/</a:t>
+            </a:r>
+            <a:endParaRPr lang="en-US" dirty="0"/>
           </a:p>
           <a:p>
             <a:pPr lvl="1"/>
@@ -4135,6 +4190,358 @@
           <p:cNvPr id="2" name="Title 1">
             <a:extLst>
               <a:ext uri="{FF2B5EF4-FFF2-40B4-BE49-F238E27FC236}">
+                <a16:creationId xmlns:a16="http://schemas.microsoft.com/office/drawing/2014/main" id="{06ED328B-3AEF-BEDE-AC0F-F33703FFE888}"/>
+              </a:ext>
+            </a:extLst>
+          </p:cNvPr>
+          <p:cNvSpPr>
+            <a:spLocks noGrp="1"/>
+          </p:cNvSpPr>
+          <p:nvPr>
+            <p:ph type="title"/>
+          </p:nvPr>
+        </p:nvSpPr>
+        <p:spPr/>
+        <p:txBody>
+          <a:bodyPr/>
+          <a:lstStyle/>
+          <a:p>
+            <a:r>
+              <a:rPr lang="en-US" dirty="0"/>
+              <a:t>Issues and To do</a:t>
+            </a:r>
+          </a:p>
+        </p:txBody>
+      </p:sp>
+      <p:sp>
+        <p:nvSpPr>
+          <p:cNvPr id="3" name="Content Placeholder 2">
+            <a:extLst>
+              <a:ext uri="{FF2B5EF4-FFF2-40B4-BE49-F238E27FC236}">
+                <a16:creationId xmlns:a16="http://schemas.microsoft.com/office/drawing/2014/main" id="{61E806E1-B4AB-6635-73B2-94C835015AE9}"/>
+              </a:ext>
+            </a:extLst>
+          </p:cNvPr>
+          <p:cNvSpPr>
+            <a:spLocks noGrp="1"/>
+          </p:cNvSpPr>
+          <p:nvPr>
+            <p:ph idx="1"/>
+          </p:nvPr>
+        </p:nvSpPr>
+        <p:spPr/>
+        <p:txBody>
+          <a:bodyPr/>
+          <a:lstStyle/>
+          <a:p>
+            <a:r>
+              <a:rPr lang="en-US" dirty="0"/>
+              <a:t>For the Interface Reference Topology</a:t>
+            </a:r>
+          </a:p>
+          <a:p>
+            <a:pPr lvl="1"/>
+            <a:r>
+              <a:rPr lang="en-US" b="0" i="0" u="none" strike="noStrike" dirty="0">
+                <a:solidFill>
+                  <a:srgbClr val="24292F"/>
+                </a:solidFill>
+                <a:effectLst/>
+                <a:latin typeface="-apple-system"/>
+                <a:hlinkClick r:id="rId2"/>
+              </a:rPr>
+              <a:t>Issue #3</a:t>
+            </a:r>
+            <a:r>
+              <a:rPr lang="en-US" b="0" i="0" dirty="0">
+                <a:solidFill>
+                  <a:srgbClr val="24292F"/>
+                </a:solidFill>
+                <a:effectLst/>
+                <a:latin typeface="-apple-system"/>
+              </a:rPr>
+              <a:t> has two open topics</a:t>
+            </a:r>
+          </a:p>
+          <a:p>
+            <a:pPr marL="1200150" lvl="2" indent="-285750"/>
+            <a:r>
+              <a:rPr lang="en-US" b="0" i="0" dirty="0">
+                <a:solidFill>
+                  <a:srgbClr val="24292F"/>
+                </a:solidFill>
+                <a:effectLst/>
+                <a:latin typeface="-apple-system"/>
+              </a:rPr>
+              <a:t>Location of </a:t>
+            </a:r>
+            <a:r>
+              <a:rPr lang="en-US" b="0" i="0" dirty="0" err="1">
+                <a:solidFill>
+                  <a:srgbClr val="24292F"/>
+                </a:solidFill>
+                <a:effectLst/>
+                <a:latin typeface="-apple-system"/>
+              </a:rPr>
+              <a:t>tp</a:t>
+            </a:r>
+            <a:r>
+              <a:rPr lang="en-US" b="0" i="0" dirty="0">
+                <a:solidFill>
+                  <a:srgbClr val="24292F"/>
+                </a:solidFill>
+                <a:effectLst/>
+                <a:latin typeface="-apple-system"/>
+              </a:rPr>
+              <a:t>-to-interface-ref node in the YANG tree. The authors agree, but the change has not yet been implemented. Add this information to the presentation for IETF 116.</a:t>
+            </a:r>
+          </a:p>
+          <a:p>
+            <a:pPr marL="1200150" lvl="2" indent="-285750"/>
+            <a:r>
+              <a:rPr lang="en-US" b="0" i="0" dirty="0">
+                <a:solidFill>
+                  <a:srgbClr val="24292F"/>
+                </a:solidFill>
+                <a:effectLst/>
+                <a:latin typeface="-apple-system"/>
+              </a:rPr>
+              <a:t>Which working group will be the best home to progress if-ref-topo-yang and bwa-topo-yang</a:t>
+            </a:r>
+          </a:p>
+          <a:p>
+            <a:pPr marL="1200150" lvl="2" indent="-285750"/>
+            <a:r>
+              <a:rPr lang="en-US" b="0" i="0" dirty="0">
+                <a:solidFill>
+                  <a:srgbClr val="24292F"/>
+                </a:solidFill>
+                <a:effectLst/>
+                <a:latin typeface="-apple-system"/>
+              </a:rPr>
+              <a:t>Created new issues to highlight the discussions that need to complete.</a:t>
+            </a:r>
+          </a:p>
+          <a:p>
+            <a:pPr marL="1657350" lvl="3" indent="-285750"/>
+            <a:r>
+              <a:rPr lang="en-US" b="0" i="0" u="none" strike="noStrike" dirty="0">
+                <a:solidFill>
+                  <a:srgbClr val="24292F"/>
+                </a:solidFill>
+                <a:effectLst/>
+                <a:latin typeface="-apple-system"/>
+                <a:hlinkClick r:id="rId3"/>
+              </a:rPr>
+              <a:t>if-ref-topo-yang-git: Issue #5</a:t>
+            </a:r>
+            <a:r>
+              <a:rPr lang="en-US" b="0" i="0" dirty="0">
+                <a:solidFill>
+                  <a:srgbClr val="24292F"/>
+                </a:solidFill>
+                <a:effectLst/>
+                <a:latin typeface="-apple-system"/>
+              </a:rPr>
+              <a:t>, update the location of </a:t>
+            </a:r>
+            <a:r>
+              <a:rPr lang="en-US" b="0" i="0" dirty="0" err="1">
+                <a:solidFill>
+                  <a:srgbClr val="24292F"/>
+                </a:solidFill>
+                <a:effectLst/>
+                <a:latin typeface="-apple-system"/>
+              </a:rPr>
+              <a:t>tp</a:t>
+            </a:r>
+            <a:r>
+              <a:rPr lang="en-US" b="0" i="0" dirty="0">
+                <a:solidFill>
+                  <a:srgbClr val="24292F"/>
+                </a:solidFill>
+                <a:effectLst/>
+                <a:latin typeface="-apple-system"/>
+              </a:rPr>
+              <a:t>-to-interface-ref node.</a:t>
+            </a:r>
+          </a:p>
+          <a:p>
+            <a:pPr marL="1657350" lvl="3" indent="-285750"/>
+            <a:r>
+              <a:rPr lang="en-US" b="0" i="0" u="none" strike="noStrike" dirty="0">
+                <a:solidFill>
+                  <a:srgbClr val="24292F"/>
+                </a:solidFill>
+                <a:effectLst/>
+                <a:latin typeface="-apple-system"/>
+                <a:hlinkClick r:id="rId4"/>
+              </a:rPr>
+              <a:t>if-ref-topo-yang-git: Issue #6</a:t>
+            </a:r>
+            <a:r>
+              <a:rPr lang="en-US" b="0" i="0" dirty="0">
+                <a:solidFill>
+                  <a:srgbClr val="24292F"/>
+                </a:solidFill>
+                <a:effectLst/>
+                <a:latin typeface="-apple-system"/>
+              </a:rPr>
+              <a:t>, find a working group home for bwa-topo-yang and if-ref-topo-yang.</a:t>
+            </a:r>
+          </a:p>
+          <a:p>
+            <a:pPr marL="285750" indent="-285750"/>
+            <a:r>
+              <a:rPr lang="en-US" b="0" i="0" dirty="0">
+                <a:solidFill>
+                  <a:srgbClr val="24292F"/>
+                </a:solidFill>
+                <a:effectLst/>
+                <a:latin typeface="-apple-system"/>
+              </a:rPr>
+              <a:t>Keep the Informative Example in mw-topo-yang up to date with any changes to tree structure related to issue above</a:t>
+            </a:r>
+          </a:p>
+          <a:p>
+            <a:pPr marL="1657350" lvl="3" indent="-285750"/>
+            <a:endParaRPr lang="en-US" b="0" i="0" dirty="0">
+              <a:solidFill>
+                <a:srgbClr val="24292F"/>
+              </a:solidFill>
+              <a:effectLst/>
+              <a:latin typeface="-apple-system"/>
+            </a:endParaRPr>
+          </a:p>
+          <a:p>
+            <a:pPr lvl="1"/>
+            <a:endParaRPr lang="en-US" dirty="0"/>
+          </a:p>
+        </p:txBody>
+      </p:sp>
+      <p:sp>
+        <p:nvSpPr>
+          <p:cNvPr id="4" name="Date Placeholder 3">
+            <a:extLst>
+              <a:ext uri="{FF2B5EF4-FFF2-40B4-BE49-F238E27FC236}">
+                <a16:creationId xmlns:a16="http://schemas.microsoft.com/office/drawing/2014/main" id="{184A4C69-9386-3936-F80D-0568162CBCC2}"/>
+              </a:ext>
+            </a:extLst>
+          </p:cNvPr>
+          <p:cNvSpPr>
+            <a:spLocks noGrp="1"/>
+          </p:cNvSpPr>
+          <p:nvPr>
+            <p:ph type="dt" sz="half" idx="10"/>
+          </p:nvPr>
+        </p:nvSpPr>
+        <p:spPr/>
+        <p:txBody>
+          <a:bodyPr/>
+          <a:lstStyle/>
+          <a:p>
+            <a:r>
+              <a:rPr lang="sv-SE"/>
+              <a:t>March 2023</a:t>
+            </a:r>
+            <a:endParaRPr lang="en-US" dirty="0"/>
+          </a:p>
+        </p:txBody>
+      </p:sp>
+      <p:sp>
+        <p:nvSpPr>
+          <p:cNvPr id="5" name="Footer Placeholder 4">
+            <a:extLst>
+              <a:ext uri="{FF2B5EF4-FFF2-40B4-BE49-F238E27FC236}">
+                <a16:creationId xmlns:a16="http://schemas.microsoft.com/office/drawing/2014/main" id="{A604281C-8D3B-648F-46A5-79089DA8D21D}"/>
+              </a:ext>
+            </a:extLst>
+          </p:cNvPr>
+          <p:cNvSpPr>
+            <a:spLocks noGrp="1"/>
+          </p:cNvSpPr>
+          <p:nvPr>
+            <p:ph type="ftr" sz="quarter" idx="11"/>
+          </p:nvPr>
+        </p:nvSpPr>
+        <p:spPr/>
+        <p:txBody>
+          <a:bodyPr/>
+          <a:lstStyle/>
+          <a:p>
+            <a:r>
+              <a:rPr lang="en-US"/>
+              <a:t>draft-ietf-ccamp-mw-topo-yang-05</a:t>
+            </a:r>
+            <a:endParaRPr lang="en-US" dirty="0"/>
+          </a:p>
+        </p:txBody>
+      </p:sp>
+      <p:sp>
+        <p:nvSpPr>
+          <p:cNvPr id="6" name="Slide Number Placeholder 5">
+            <a:extLst>
+              <a:ext uri="{FF2B5EF4-FFF2-40B4-BE49-F238E27FC236}">
+                <a16:creationId xmlns:a16="http://schemas.microsoft.com/office/drawing/2014/main" id="{EAEFBFB7-97BF-6DEC-0B4B-34E771AC8AC1}"/>
+              </a:ext>
+            </a:extLst>
+          </p:cNvPr>
+          <p:cNvSpPr>
+            <a:spLocks noGrp="1"/>
+          </p:cNvSpPr>
+          <p:nvPr>
+            <p:ph type="sldNum" sz="quarter" idx="12"/>
+          </p:nvPr>
+        </p:nvSpPr>
+        <p:spPr/>
+        <p:txBody>
+          <a:bodyPr/>
+          <a:lstStyle/>
+          <a:p>
+            <a:fld id="{6FB242F4-3B75-4E3C-A0AC-3666538EA635}" type="slidenum">
+              <a:rPr lang="en-US" smtClean="0"/>
+              <a:pPr/>
+              <a:t>3</a:t>
+            </a:fld>
+            <a:endParaRPr lang="en-US"/>
+          </a:p>
+        </p:txBody>
+      </p:sp>
+    </p:spTree>
+    <p:extLst>
+      <p:ext uri="{BB962C8B-B14F-4D97-AF65-F5344CB8AC3E}">
+        <p14:creationId xmlns:p14="http://schemas.microsoft.com/office/powerpoint/2010/main" val="1729357203"/>
+      </p:ext>
+    </p:extLst>
+  </p:cSld>
+  <p:clrMapOvr>
+    <a:masterClrMapping/>
+  </p:clrMapOvr>
+</p:sld>
+</file>
+
+<file path=ppt/slides/slide4.xml><?xml version="1.0" encoding="utf-8"?>
+<p:sld xmlns:a="http://schemas.openxmlformats.org/drawingml/2006/main" xmlns:r="http://schemas.openxmlformats.org/officeDocument/2006/relationships" xmlns:p="http://schemas.openxmlformats.org/presentationml/2006/main">
+  <p:cSld>
+    <p:spTree>
+      <p:nvGrpSpPr>
+        <p:cNvPr id="1" name=""/>
+        <p:cNvGrpSpPr/>
+        <p:nvPr/>
+      </p:nvGrpSpPr>
+      <p:grpSpPr>
+        <a:xfrm>
+          <a:off x="0" y="0"/>
+          <a:ext cx="0" cy="0"/>
+          <a:chOff x="0" y="0"/>
+          <a:chExt cx="0" cy="0"/>
+        </a:xfrm>
+      </p:grpSpPr>
+      <p:sp>
+        <p:nvSpPr>
+          <p:cNvPr id="2" name="Title 1">
+            <a:extLst>
+              <a:ext uri="{FF2B5EF4-FFF2-40B4-BE49-F238E27FC236}">
                 <a16:creationId xmlns:a16="http://schemas.microsoft.com/office/drawing/2014/main" id="{7EF8726D-BF3F-4177-BAF9-FC40045DD20A}"/>
               </a:ext>
             </a:extLst>
@@ -4176,7 +4583,9 @@
         </p:nvSpPr>
         <p:spPr/>
         <p:txBody>
-          <a:bodyPr/>
+          <a:bodyPr>
+            <a:normAutofit fontScale="85000" lnSpcReduction="20000"/>
+          </a:bodyPr>
           <a:lstStyle/>
           <a:p>
             <a:r>
@@ -4191,16 +4600,49 @@
             </a:r>
           </a:p>
           <a:p>
+            <a:pPr lvl="1"/>
             <a:r>
               <a:rPr lang="en-US" dirty="0"/>
-              <a:t>Discuss plan for an update to RFC 8561</a:t>
+              <a:t>And find a home working group</a:t>
+            </a:r>
+          </a:p>
+          <a:p>
+            <a:r>
+              <a:rPr lang="en-US" dirty="0"/>
+              <a:t>Continue weekly conference calls</a:t>
             </a:r>
           </a:p>
           <a:p>
             <a:pPr lvl="1"/>
             <a:r>
               <a:rPr lang="en-US" dirty="0"/>
-              <a:t>Discuss still in “individual draft” state</a:t>
+              <a:t>0500-0600 (UTC -4) (EDT)</a:t>
+            </a:r>
+          </a:p>
+          <a:p>
+            <a:r>
+              <a:rPr lang="en-US" dirty="0"/>
+              <a:t>Discuss plan for an update to RFC 8561 (A YANG Data Model for Microwave Radio Link)</a:t>
+            </a:r>
+          </a:p>
+          <a:p>
+            <a:pPr lvl="1"/>
+            <a:r>
+              <a:rPr lang="en-US" dirty="0"/>
+              <a:t>The draft is still in “individual draft” state</a:t>
+            </a:r>
+          </a:p>
+          <a:p>
+            <a:pPr lvl="2"/>
+            <a:r>
+              <a:rPr lang="en-US" dirty="0">
+                <a:hlinkClick r:id="rId2"/>
+              </a:rPr>
+              <a:t>https://github.com/samans/draft-ybam-rfc8561bis</a:t>
+            </a:r>
+            <a:r>
+              <a:rPr lang="en-US" dirty="0"/>
+              <a:t> </a:t>
             </a:r>
           </a:p>
           <a:p>
@@ -4315,7 +4757,7 @@
             <a:fld id="{6FB242F4-3B75-4E3C-A0AC-3666538EA635}" type="slidenum">
               <a:rPr lang="en-US" smtClean="0"/>
               <a:pPr/>
-              <a:t>3</a:t>
+              <a:t>4</a:t>
             </a:fld>
             <a:endParaRPr lang="en-US"/>
           </a:p>

</xml_diff>

<commit_message>
Fixed typo in presentation for IETF 116
</commit_message>
<xml_diff>
--- a/presentations/IETF 116 - YANG Data Model for Microwave Topology-05-v01.pptx
+++ b/presentations/IETF 116 - YANG Data Model for Microwave Topology-05-v01.pptx
@@ -4293,11 +4293,31 @@
                 <a:effectLst/>
                 <a:latin typeface="-apple-system"/>
               </a:rPr>
-              <a:t>-to-interface-ref node in the YANG tree. The authors agree, but the change has not yet been implemented. Add this information to the presentation for IETF 116.</a:t>
+              <a:t>-to-interface-ref node in the YANG tree. The authors agree, but the change has not yet been implemented</a:t>
+            </a:r>
+            <a:r>
+              <a:rPr lang="en-US" b="0" i="0">
+                <a:solidFill>
+                  <a:srgbClr val="24292F"/>
+                </a:solidFill>
+                <a:effectLst/>
+                <a:latin typeface="-apple-system"/>
+              </a:rPr>
+              <a:t>. </a:t>
             </a:r>
           </a:p>
           <a:p>
             <a:pPr marL="1200150" lvl="2" indent="-285750"/>
+            <a:r>
+              <a:rPr lang="en-US" b="0" i="0">
+                <a:solidFill>
+                  <a:srgbClr val="24292F"/>
+                </a:solidFill>
+                <a:effectLst/>
+                <a:latin typeface="-apple-system"/>
+              </a:rPr>
+              <a:t>Which </a:t>
+            </a:r>
             <a:r>
               <a:rPr lang="en-US" b="0" i="0" dirty="0">
                 <a:solidFill>
@@ -4306,7 +4326,7 @@
                 <a:effectLst/>
                 <a:latin typeface="-apple-system"/>
               </a:rPr>
-              <a:t>Which working group will be the best home to progress if-ref-topo-yang and bwa-topo-yang</a:t>
+              <a:t>working group will be the best home to progress if-ref-topo-yang and bwa-topo-yang</a:t>
             </a:r>
           </a:p>
           <a:p>

</xml_diff>